<commit_message>
small fixes into example and lection
</commit_message>
<xml_diff>
--- a/lections/cpp_craft_lec_5_pre.pptx
+++ b/lections/cpp_craft_lec_5_pre.pptx
@@ -309,7 +309,8 @@
           <a:p>
             <a:fld id="{617A4F30-FB30-424F-9F07-D851740F429F}" type="datetimeFigureOut">
               <a:rPr lang="en-US" smtClean="0"/>
-              <a:t>10/30/2013</a:t>
+              <a:pPr/>
+              <a:t>10/31/2013</a:t>
             </a:fld>
             <a:endParaRPr lang="en-US"/>
           </a:p>
@@ -351,6 +352,7 @@
           <a:p>
             <a:fld id="{BAD4C8DF-620A-4BF7-B959-0BEA8160DB63}" type="slidenum">
               <a:rPr lang="en-US" smtClean="0"/>
+              <a:pPr/>
               <a:t>‹#›</a:t>
             </a:fld>
             <a:endParaRPr lang="en-US"/>
@@ -474,7 +476,8 @@
           <a:p>
             <a:fld id="{617A4F30-FB30-424F-9F07-D851740F429F}" type="datetimeFigureOut">
               <a:rPr lang="en-US" smtClean="0"/>
-              <a:t>10/30/2013</a:t>
+              <a:pPr/>
+              <a:t>10/31/2013</a:t>
             </a:fld>
             <a:endParaRPr lang="en-US"/>
           </a:p>
@@ -516,6 +519,7 @@
           <a:p>
             <a:fld id="{BAD4C8DF-620A-4BF7-B959-0BEA8160DB63}" type="slidenum">
               <a:rPr lang="en-US" smtClean="0"/>
+              <a:pPr/>
               <a:t>‹#›</a:t>
             </a:fld>
             <a:endParaRPr lang="en-US"/>
@@ -649,7 +653,8 @@
           <a:p>
             <a:fld id="{617A4F30-FB30-424F-9F07-D851740F429F}" type="datetimeFigureOut">
               <a:rPr lang="en-US" smtClean="0"/>
-              <a:t>10/30/2013</a:t>
+              <a:pPr/>
+              <a:t>10/31/2013</a:t>
             </a:fld>
             <a:endParaRPr lang="en-US"/>
           </a:p>
@@ -691,6 +696,7 @@
           <a:p>
             <a:fld id="{BAD4C8DF-620A-4BF7-B959-0BEA8160DB63}" type="slidenum">
               <a:rPr lang="en-US" smtClean="0"/>
+              <a:pPr/>
               <a:t>‹#›</a:t>
             </a:fld>
             <a:endParaRPr lang="en-US"/>
@@ -814,7 +820,8 @@
           <a:p>
             <a:fld id="{617A4F30-FB30-424F-9F07-D851740F429F}" type="datetimeFigureOut">
               <a:rPr lang="en-US" smtClean="0"/>
-              <a:t>10/30/2013</a:t>
+              <a:pPr/>
+              <a:t>10/31/2013</a:t>
             </a:fld>
             <a:endParaRPr lang="en-US"/>
           </a:p>
@@ -856,6 +863,7 @@
           <a:p>
             <a:fld id="{BAD4C8DF-620A-4BF7-B959-0BEA8160DB63}" type="slidenum">
               <a:rPr lang="en-US" smtClean="0"/>
+              <a:pPr/>
               <a:t>‹#›</a:t>
             </a:fld>
             <a:endParaRPr lang="en-US"/>
@@ -1055,7 +1063,8 @@
           <a:p>
             <a:fld id="{617A4F30-FB30-424F-9F07-D851740F429F}" type="datetimeFigureOut">
               <a:rPr lang="en-US" smtClean="0"/>
-              <a:t>10/30/2013</a:t>
+              <a:pPr/>
+              <a:t>10/31/2013</a:t>
             </a:fld>
             <a:endParaRPr lang="en-US"/>
           </a:p>
@@ -1097,6 +1106,7 @@
           <a:p>
             <a:fld id="{BAD4C8DF-620A-4BF7-B959-0BEA8160DB63}" type="slidenum">
               <a:rPr lang="en-US" smtClean="0"/>
+              <a:pPr/>
               <a:t>‹#›</a:t>
             </a:fld>
             <a:endParaRPr lang="en-US"/>
@@ -1338,7 +1348,8 @@
           <a:p>
             <a:fld id="{617A4F30-FB30-424F-9F07-D851740F429F}" type="datetimeFigureOut">
               <a:rPr lang="en-US" smtClean="0"/>
-              <a:t>10/30/2013</a:t>
+              <a:pPr/>
+              <a:t>10/31/2013</a:t>
             </a:fld>
             <a:endParaRPr lang="en-US"/>
           </a:p>
@@ -1380,6 +1391,7 @@
           <a:p>
             <a:fld id="{BAD4C8DF-620A-4BF7-B959-0BEA8160DB63}" type="slidenum">
               <a:rPr lang="en-US" smtClean="0"/>
+              <a:pPr/>
               <a:t>‹#›</a:t>
             </a:fld>
             <a:endParaRPr lang="en-US"/>
@@ -1755,7 +1767,8 @@
           <a:p>
             <a:fld id="{617A4F30-FB30-424F-9F07-D851740F429F}" type="datetimeFigureOut">
               <a:rPr lang="en-US" smtClean="0"/>
-              <a:t>10/30/2013</a:t>
+              <a:pPr/>
+              <a:t>10/31/2013</a:t>
             </a:fld>
             <a:endParaRPr lang="en-US"/>
           </a:p>
@@ -1797,6 +1810,7 @@
           <a:p>
             <a:fld id="{BAD4C8DF-620A-4BF7-B959-0BEA8160DB63}" type="slidenum">
               <a:rPr lang="en-US" smtClean="0"/>
+              <a:pPr/>
               <a:t>‹#›</a:t>
             </a:fld>
             <a:endParaRPr lang="en-US"/>
@@ -1868,7 +1882,8 @@
           <a:p>
             <a:fld id="{617A4F30-FB30-424F-9F07-D851740F429F}" type="datetimeFigureOut">
               <a:rPr lang="en-US" smtClean="0"/>
-              <a:t>10/30/2013</a:t>
+              <a:pPr/>
+              <a:t>10/31/2013</a:t>
             </a:fld>
             <a:endParaRPr lang="en-US"/>
           </a:p>
@@ -1910,6 +1925,7 @@
           <a:p>
             <a:fld id="{BAD4C8DF-620A-4BF7-B959-0BEA8160DB63}" type="slidenum">
               <a:rPr lang="en-US" smtClean="0"/>
+              <a:pPr/>
               <a:t>‹#›</a:t>
             </a:fld>
             <a:endParaRPr lang="en-US"/>
@@ -1958,7 +1974,8 @@
           <a:p>
             <a:fld id="{617A4F30-FB30-424F-9F07-D851740F429F}" type="datetimeFigureOut">
               <a:rPr lang="en-US" smtClean="0"/>
-              <a:t>10/30/2013</a:t>
+              <a:pPr/>
+              <a:t>10/31/2013</a:t>
             </a:fld>
             <a:endParaRPr lang="en-US"/>
           </a:p>
@@ -2000,6 +2017,7 @@
           <a:p>
             <a:fld id="{BAD4C8DF-620A-4BF7-B959-0BEA8160DB63}" type="slidenum">
               <a:rPr lang="en-US" smtClean="0"/>
+              <a:pPr/>
               <a:t>‹#›</a:t>
             </a:fld>
             <a:endParaRPr lang="en-US"/>
@@ -2230,7 +2248,8 @@
           <a:p>
             <a:fld id="{617A4F30-FB30-424F-9F07-D851740F429F}" type="datetimeFigureOut">
               <a:rPr lang="en-US" smtClean="0"/>
-              <a:t>10/30/2013</a:t>
+              <a:pPr/>
+              <a:t>10/31/2013</a:t>
             </a:fld>
             <a:endParaRPr lang="en-US"/>
           </a:p>
@@ -2272,6 +2291,7 @@
           <a:p>
             <a:fld id="{BAD4C8DF-620A-4BF7-B959-0BEA8160DB63}" type="slidenum">
               <a:rPr lang="en-US" smtClean="0"/>
+              <a:pPr/>
               <a:t>‹#›</a:t>
             </a:fld>
             <a:endParaRPr lang="en-US"/>
@@ -2478,7 +2498,8 @@
           <a:p>
             <a:fld id="{617A4F30-FB30-424F-9F07-D851740F429F}" type="datetimeFigureOut">
               <a:rPr lang="en-US" smtClean="0"/>
-              <a:t>10/30/2013</a:t>
+              <a:pPr/>
+              <a:t>10/31/2013</a:t>
             </a:fld>
             <a:endParaRPr lang="en-US"/>
           </a:p>
@@ -2520,6 +2541,7 @@
           <a:p>
             <a:fld id="{BAD4C8DF-620A-4BF7-B959-0BEA8160DB63}" type="slidenum">
               <a:rPr lang="en-US" smtClean="0"/>
+              <a:pPr/>
               <a:t>‹#›</a:t>
             </a:fld>
             <a:endParaRPr lang="en-US"/>
@@ -2686,7 +2708,8 @@
           <a:p>
             <a:fld id="{617A4F30-FB30-424F-9F07-D851740F429F}" type="datetimeFigureOut">
               <a:rPr lang="en-US" smtClean="0"/>
-              <a:t>10/30/2013</a:t>
+              <a:pPr/>
+              <a:t>10/31/2013</a:t>
             </a:fld>
             <a:endParaRPr lang="en-US"/>
           </a:p>
@@ -2764,6 +2787,7 @@
           <a:p>
             <a:fld id="{BAD4C8DF-620A-4BF7-B959-0BEA8160DB63}" type="slidenum">
               <a:rPr lang="en-US" smtClean="0"/>
+              <a:pPr/>
               <a:t>‹#›</a:t>
             </a:fld>
             <a:endParaRPr lang="en-US"/>
@@ -3077,11 +3101,7 @@
             </a:r>
             <a:r>
               <a:rPr lang="en-US" dirty="0" smtClean="0"/>
-              <a:t>Craft: </a:t>
-            </a:r>
-            <a:r>
-              <a:rPr lang="en-US" dirty="0" smtClean="0"/>
-              <a:t>#5</a:t>
+              <a:t>Craft: #5</a:t>
             </a:r>
             <a:endParaRPr lang="en-US" dirty="0"/>
           </a:p>
@@ -3108,7 +3128,6 @@
               <a:rPr lang="ru-RU" dirty="0" smtClean="0"/>
               <a:t>Шаблоны функций</a:t>
             </a:r>
-            <a:endParaRPr lang="ru-RU" dirty="0" smtClean="0"/>
           </a:p>
           <a:p>
             <a:r>
@@ -3340,12 +3359,22 @@
             </a:r>
             <a:r>
               <a:rPr lang="en-US" dirty="0"/>
-              <a:t>) { </a:t>
-            </a:r>
-            <a:r>
-              <a:rPr lang="en-US" dirty="0" smtClean="0"/>
-              <a:t> //… }</a:t>
-            </a:r>
+              <a:t>) </a:t>
+            </a:r>
+            <a:endParaRPr lang="ru-RU" dirty="0" smtClean="0"/>
+          </a:p>
+          <a:p>
+            <a:r>
+              <a:rPr lang="en-US" dirty="0" smtClean="0"/>
+              <a:t>{  </a:t>
+            </a:r>
+            <a:r>
+              <a:rPr lang="en-US" dirty="0" smtClean="0"/>
+              <a:t>//… }</a:t>
+            </a:r>
+            <a:endParaRPr lang="ru-RU" dirty="0" smtClean="0"/>
+          </a:p>
+          <a:p>
             <a:endParaRPr lang="ru-RU" dirty="0" smtClean="0"/>
           </a:p>
           <a:p>
@@ -3473,12 +3502,24 @@
             </a:r>
             <a:r>
               <a:rPr lang="en-US" dirty="0" smtClean="0"/>
-              <a:t>) { //… }</a:t>
+              <a:t>) </a:t>
             </a:r>
             <a:endParaRPr lang="ru-RU" dirty="0" smtClean="0"/>
           </a:p>
           <a:p>
-            <a:endParaRPr lang="en-US" dirty="0"/>
+            <a:r>
+              <a:rPr lang="en-US" dirty="0" smtClean="0"/>
+              <a:t>{ </a:t>
+            </a:r>
+            <a:r>
+              <a:rPr lang="en-US" dirty="0" smtClean="0"/>
+              <a:t>//… </a:t>
+            </a:r>
+            <a:r>
+              <a:rPr lang="en-US" dirty="0" smtClean="0"/>
+              <a:t>}</a:t>
+            </a:r>
+            <a:endParaRPr lang="ru-RU" dirty="0" smtClean="0"/>
           </a:p>
         </p:txBody>
       </p:sp>
@@ -3621,23 +3662,51 @@
           <a:p>
             <a:r>
               <a:rPr lang="ru-RU" dirty="0" smtClean="0"/>
-              <a:t>константные выражения</a:t>
-            </a:r>
-          </a:p>
-          <a:p>
-            <a:r>
-              <a:rPr lang="ru-RU" dirty="0" smtClean="0"/>
-              <a:t>адрес объекта или функции с внешней компоновкой</a:t>
-            </a:r>
-          </a:p>
-          <a:p>
-            <a:r>
-              <a:rPr lang="ru-RU" dirty="0" err="1" smtClean="0"/>
-              <a:t>неперегруженный</a:t>
-            </a:r>
-            <a:r>
-              <a:rPr lang="ru-RU" dirty="0" smtClean="0"/>
-              <a:t> указатель на член</a:t>
+              <a:t>К</a:t>
+            </a:r>
+            <a:r>
+              <a:rPr lang="ru-RU" dirty="0" smtClean="0"/>
+              <a:t>онстантные </a:t>
+            </a:r>
+            <a:r>
+              <a:rPr lang="ru-RU" dirty="0" smtClean="0"/>
+              <a:t>выражения</a:t>
+            </a:r>
+          </a:p>
+          <a:p>
+            <a:r>
+              <a:rPr lang="ru-RU" dirty="0" smtClean="0"/>
+              <a:t>А</a:t>
+            </a:r>
+            <a:r>
+              <a:rPr lang="ru-RU" dirty="0" smtClean="0"/>
+              <a:t>дрес </a:t>
+            </a:r>
+            <a:r>
+              <a:rPr lang="ru-RU" dirty="0" smtClean="0"/>
+              <a:t>объекта или функции с внешней компоновкой</a:t>
+            </a:r>
+          </a:p>
+          <a:p>
+            <a:r>
+              <a:rPr lang="ru-RU" dirty="0" smtClean="0"/>
+              <a:t>Н</a:t>
+            </a:r>
+            <a:r>
+              <a:rPr lang="ru-RU" dirty="0" smtClean="0"/>
+              <a:t>е</a:t>
+            </a:r>
+            <a:r>
+              <a:rPr lang="en-US" dirty="0" smtClean="0"/>
+              <a:t> </a:t>
+            </a:r>
+            <a:r>
+              <a:rPr lang="ru-RU" dirty="0" smtClean="0"/>
+              <a:t>перегруженный </a:t>
+            </a:r>
+            <a:r>
+              <a:rPr lang="ru-RU" dirty="0" smtClean="0"/>
+              <a:t>указатель на член</a:t>
             </a:r>
           </a:p>
         </p:txBody>
@@ -3772,7 +3841,15 @@
             </a:r>
             <a:r>
               <a:rPr lang="en-US" dirty="0" smtClean="0"/>
-              <a:t>T v[  max ];</a:t>
+              <a:t>T v[ </a:t>
+            </a:r>
+            <a:r>
+              <a:rPr lang="en-US" dirty="0" smtClean="0"/>
+              <a:t>max </a:t>
+            </a:r>
+            <a:r>
+              <a:rPr lang="en-US" dirty="0" smtClean="0"/>
+              <a:t>];</a:t>
             </a:r>
           </a:p>
           <a:p>
@@ -3878,11 +3955,7 @@
             </a:r>
             <a:r>
               <a:rPr lang="en-US" dirty="0" err="1" smtClean="0"/>
-              <a:t>i_</a:t>
-            </a:r>
-            <a:r>
-              <a:rPr lang="en-US" dirty="0" err="1" smtClean="0"/>
-              <a:t>buff</a:t>
+              <a:t>i_buff</a:t>
             </a:r>
             <a:r>
               <a:rPr lang="en-US" dirty="0" smtClean="0"/>
@@ -3928,11 +4001,7 @@
             </a:r>
             <a:r>
               <a:rPr lang="en-US" dirty="0" err="1" smtClean="0"/>
-              <a:t>my_</a:t>
-            </a:r>
-            <a:r>
-              <a:rPr lang="en-US" dirty="0" err="1" smtClean="0"/>
-              <a:t>buff</a:t>
+              <a:t>my_buff</a:t>
             </a:r>
             <a:r>
               <a:rPr lang="en-US" dirty="0" smtClean="0"/>
@@ -3952,15 +4021,7 @@
             </a:r>
             <a:r>
               <a:rPr lang="en-US" dirty="0" smtClean="0"/>
-              <a:t>buffer&lt; </a:t>
-            </a:r>
-            <a:r>
-              <a:rPr lang="en-US" dirty="0" smtClean="0"/>
-              <a:t>class</a:t>
-            </a:r>
-            <a:r>
-              <a:rPr lang="en-US" dirty="0" smtClean="0"/>
-              <a:t>,  10 &gt; </a:t>
+              <a:t>buffer&lt; class,  10 &gt; </a:t>
             </a:r>
             <a:r>
               <a:rPr lang="en-US" dirty="0" err="1" smtClean="0"/>
@@ -4014,7 +4075,7 @@
         </p:nvSpPr>
         <p:spPr>
           <a:xfrm flipH="1">
-            <a:off x="5791200" y="4495800"/>
+            <a:off x="5791200" y="4632579"/>
             <a:ext cx="1981200" cy="685800"/>
           </a:xfrm>
           <a:prstGeom prst="wedgeRoundRectCallout">
@@ -4081,7 +4142,7 @@
           <a:p>
             <a:r>
               <a:rPr lang="ru-RU" dirty="0" smtClean="0"/>
-              <a:t>выведение</a:t>
+              <a:t>выведение типа</a:t>
             </a:r>
             <a:endParaRPr lang="en-US" dirty="0"/>
           </a:p>
@@ -4096,7 +4157,7 @@
         <p:spPr>
           <a:xfrm>
             <a:off x="990600" y="1676400"/>
-            <a:ext cx="7543800" cy="2590800"/>
+            <a:ext cx="7543800" cy="2819400"/>
           </a:xfrm>
           <a:prstGeom prst="roundRect">
             <a:avLst/>
@@ -4132,7 +4193,18 @@
             </a:r>
             <a:r>
               <a:rPr lang="en-US" dirty="0" smtClean="0"/>
-              <a:t>&gt; void sort (</a:t>
+              <a:t>&gt; </a:t>
+            </a:r>
+            <a:endParaRPr lang="ru-RU" dirty="0" smtClean="0"/>
+          </a:p>
+          <a:p>
+            <a:r>
+              <a:rPr lang="en-US" dirty="0" smtClean="0"/>
+              <a:t>void </a:t>
+            </a:r>
+            <a:r>
+              <a:rPr lang="en-US" dirty="0" smtClean="0"/>
+              <a:t>sort (</a:t>
             </a:r>
             <a:r>
               <a:rPr lang="en-US" dirty="0" err="1" smtClean="0"/>
@@ -4180,11 +4252,7 @@
             </a:r>
             <a:r>
               <a:rPr lang="en-US" dirty="0" smtClean="0"/>
-              <a:t> </a:t>
-            </a:r>
-            <a:r>
-              <a:rPr lang="en-US" dirty="0" smtClean="0"/>
-              <a:t>std::vector&lt;</a:t>
+              <a:t> std::vector&lt;</a:t>
             </a:r>
             <a:r>
               <a:rPr lang="ru-RU" dirty="0" smtClean="0"/>
@@ -4252,6 +4320,9 @@
             <a:endParaRPr lang="ru-RU" dirty="0" smtClean="0"/>
           </a:p>
           <a:p>
+            <a:endParaRPr lang="ru-RU" dirty="0" smtClean="0"/>
+          </a:p>
+          <a:p>
             <a:r>
               <a:rPr lang="en-US" dirty="0" smtClean="0"/>
               <a:t>std::sort (</a:t>
@@ -4292,11 +4363,19 @@
             </a:r>
             <a:r>
               <a:rPr lang="en-US" dirty="0" err="1" smtClean="0"/>
-              <a:t>iteratoe</a:t>
-            </a:r>
-            <a:r>
-              <a:rPr lang="en-US" dirty="0" smtClean="0"/>
-              <a:t> &gt;(</a:t>
+              <a:t>iterato</a:t>
+            </a:r>
+            <a:r>
+              <a:rPr lang="en-US" dirty="0" err="1" smtClean="0"/>
+              <a:t>r</a:t>
+            </a:r>
+            <a:r>
+              <a:rPr lang="en-US" dirty="0" smtClean="0"/>
+              <a:t> </a:t>
+            </a:r>
+            <a:r>
+              <a:rPr lang="en-US" dirty="0" smtClean="0"/>
+              <a:t>&gt;(</a:t>
             </a:r>
             <a:r>
               <a:rPr lang="ru-RU" dirty="0" smtClean="0"/>
@@ -4340,7 +4419,7 @@
         </p:blipFill>
         <p:spPr>
           <a:xfrm>
-            <a:off x="7086600" y="4724400"/>
+            <a:off x="7086600" y="4861179"/>
             <a:ext cx="1600200" cy="1768221"/>
           </a:xfrm>
           <a:prstGeom prst="rect">
@@ -4575,10 +4654,6 @@
               <a:rPr lang="en-US" dirty="0" smtClean="0"/>
               <a:t>&lt; double &gt;( complex&lt; double &gt; )</a:t>
             </a:r>
-            <a:r>
-              <a:rPr lang="en-US" dirty="0" smtClean="0"/>
-              <a:t/>
-            </a:r>
             <a:br>
               <a:rPr lang="en-US" dirty="0" smtClean="0"/>
             </a:br>
@@ -4598,8 +4673,8 @@
         </p:nvSpPr>
         <p:spPr>
           <a:xfrm>
-            <a:off x="990600" y="4648200"/>
-            <a:ext cx="7543800" cy="1676400"/>
+            <a:off x="990600" y="4572000"/>
+            <a:ext cx="7543800" cy="1752600"/>
           </a:xfrm>
           <a:prstGeom prst="roundRect">
             <a:avLst/>
@@ -4627,27 +4702,23 @@
           <a:p>
             <a:r>
               <a:rPr lang="en-US" dirty="0" smtClean="0"/>
-              <a:t>template&lt; clas</a:t>
-            </a:r>
-            <a:r>
-              <a:rPr lang="en-US" dirty="0" smtClean="0"/>
-              <a:t>s T&gt; max( </a:t>
-            </a:r>
-            <a:r>
-              <a:rPr lang="en-US" dirty="0" err="1" smtClean="0"/>
-              <a:t>cosnt</a:t>
-            </a:r>
-            <a:r>
-              <a:rPr lang="en-US" dirty="0" smtClean="0"/>
-              <a:t> T&amp;, </a:t>
-            </a:r>
-            <a:r>
-              <a:rPr lang="en-US" dirty="0" err="1" smtClean="0"/>
-              <a:t>cosnt</a:t>
-            </a:r>
-            <a:r>
-              <a:rPr lang="en-US" dirty="0" smtClean="0"/>
-              <a:t> T&amp; );</a:t>
+              <a:t>template&lt; class T&gt; max( </a:t>
+            </a:r>
+            <a:r>
+              <a:rPr lang="en-US" dirty="0" smtClean="0"/>
+              <a:t>const </a:t>
+            </a:r>
+            <a:r>
+              <a:rPr lang="en-US" dirty="0" smtClean="0"/>
+              <a:t>T&amp;, </a:t>
+            </a:r>
+            <a:r>
+              <a:rPr lang="en-US" dirty="0" smtClean="0"/>
+              <a:t>const </a:t>
+            </a:r>
+            <a:r>
+              <a:rPr lang="en-US" dirty="0" smtClean="0"/>
+              <a:t>T&amp; );</a:t>
             </a:r>
           </a:p>
           <a:p>
@@ -4672,11 +4743,23 @@
             </a:r>
             <a:r>
               <a:rPr lang="en-US" dirty="0" smtClean="0"/>
-              <a:t>max( 7, ‘a’ ); \\ </a:t>
-            </a:r>
-            <a:r>
-              <a:rPr lang="ru-RU" dirty="0" smtClean="0"/>
-              <a:t>ошибка неоднозначность, нет преобразования</a:t>
+              <a:t>max( 7, ‘a’ ); </a:t>
+            </a:r>
+            <a:r>
+              <a:rPr lang="en-US" dirty="0" smtClean="0"/>
+              <a:t>//</a:t>
+            </a:r>
+            <a:r>
+              <a:rPr lang="en-US" dirty="0" smtClean="0"/>
+              <a:t> </a:t>
+            </a:r>
+            <a:r>
+              <a:rPr lang="ru-RU" dirty="0" smtClean="0"/>
+              <a:t>неоднозначность: ошибка </a:t>
+            </a:r>
+            <a:r>
+              <a:rPr lang="ru-RU" dirty="0" smtClean="0"/>
+              <a:t>нет преобразования</a:t>
             </a:r>
             <a:endParaRPr lang="en-US" dirty="0" smtClean="0"/>
           </a:p>
@@ -4685,7 +4768,6 @@
               <a:rPr lang="en-US" dirty="0"/>
               <a:t>}</a:t>
             </a:r>
-            <a:endParaRPr lang="en-US" dirty="0"/>
           </a:p>
         </p:txBody>
       </p:sp>
@@ -4781,14 +4863,14 @@
           <a:p>
             <a:pPr marL="169863"/>
             <a:r>
-              <a:rPr lang="en-US" sz="1600" dirty="0" smtClean="0"/>
+              <a:rPr lang="en-US" sz="1600" i="1" dirty="0" smtClean="0"/>
               <a:t>// </a:t>
             </a:r>
             <a:r>
-              <a:rPr lang="en-US" sz="1600" dirty="0" err="1" smtClean="0"/>
+              <a:rPr lang="en-US" sz="1600" i="1" dirty="0" err="1" smtClean="0"/>
               <a:t>copy.h</a:t>
             </a:r>
-            <a:endParaRPr lang="en-US" sz="1600" dirty="0" smtClean="0"/>
+            <a:endParaRPr lang="en-US" sz="1600" i="1" dirty="0" smtClean="0"/>
           </a:p>
           <a:p>
             <a:pPr marL="169863"/>
@@ -4839,7 +4921,6 @@
               <a:rPr lang="en-US" sz="1600" dirty="0" smtClean="0"/>
               <a:t>}</a:t>
             </a:r>
-            <a:endParaRPr lang="en-US" sz="1600" dirty="0" smtClean="0"/>
           </a:p>
           <a:p>
             <a:pPr marL="169863"/>
@@ -4866,7 +4947,7 @@
           <a:p>
             <a:pPr marL="169863"/>
             <a:r>
-              <a:rPr lang="en-US" sz="1600" dirty="0" smtClean="0"/>
+              <a:rPr lang="en-US" sz="1600" i="1" dirty="0" smtClean="0"/>
               <a:t>// copy.cpp</a:t>
             </a:r>
           </a:p>
@@ -4935,11 +5016,7 @@
             </a:r>
             <a:r>
               <a:rPr lang="ru-RU" sz="1600" dirty="0" smtClean="0"/>
-              <a:t>тип </a:t>
-            </a:r>
-            <a:r>
-              <a:rPr lang="ru-RU" sz="1600" dirty="0" smtClean="0"/>
-              <a:t>определен через аргументы</a:t>
+              <a:t>тип определен через аргументы</a:t>
             </a:r>
             <a:endParaRPr lang="en-US" sz="1600" dirty="0" smtClean="0"/>
           </a:p>
@@ -4963,7 +5040,6 @@
               <a:rPr lang="en-US" sz="1600" dirty="0" smtClean="0"/>
               <a:t>}</a:t>
             </a:r>
-            <a:endParaRPr lang="en-US" sz="1600" dirty="0" smtClean="0"/>
           </a:p>
         </p:txBody>
       </p:sp>
@@ -5030,8 +5106,8 @@
         </p:nvSpPr>
         <p:spPr>
           <a:xfrm>
-            <a:off x="609600" y="1371600"/>
-            <a:ext cx="8305800" cy="4953000"/>
+            <a:off x="609600" y="1219200"/>
+            <a:ext cx="8305800" cy="5105400"/>
           </a:xfrm>
           <a:prstGeom prst="roundRect">
             <a:avLst/>
@@ -5099,34 +5175,28 @@
             </a:r>
             <a:r>
               <a:rPr lang="en-US" sz="1600" dirty="0" smtClean="0"/>
-              <a:t>trade = 1,</a:t>
-            </a:r>
-          </a:p>
-          <a:p>
-            <a:pPr marL="169863"/>
+              <a:t>trade = </a:t>
+            </a:r>
+            <a:r>
+              <a:rPr lang="en-US" sz="1600" dirty="0" smtClean="0"/>
+              <a:t>1, market </a:t>
+            </a:r>
+            <a:r>
+              <a:rPr lang="en-US" sz="1600" dirty="0" smtClean="0"/>
+              <a:t>= </a:t>
+            </a:r>
+            <a:r>
+              <a:rPr lang="en-US" sz="1600" dirty="0" smtClean="0"/>
+              <a:t>2, limit </a:t>
+            </a:r>
+            <a:r>
+              <a:rPr lang="en-US" sz="1600" dirty="0" smtClean="0"/>
+              <a:t>= 3,</a:t>
+            </a:r>
             <a:r>
               <a:rPr lang="en-US" sz="1600" dirty="0"/>
               <a:t>	</a:t>
             </a:r>
-            <a:r>
-              <a:rPr lang="en-US" sz="1600" dirty="0" smtClean="0"/>
-              <a:t>market = 2,</a:t>
-            </a:r>
-          </a:p>
-          <a:p>
-            <a:pPr marL="169863"/>
-            <a:r>
-              <a:rPr lang="en-US" sz="1600" dirty="0"/>
-              <a:t>	</a:t>
-            </a:r>
-            <a:r>
-              <a:rPr lang="en-US" sz="1600" dirty="0" smtClean="0"/>
-              <a:t>limit = 3,</a:t>
-            </a:r>
-            <a:r>
-              <a:rPr lang="en-US" sz="1600" dirty="0"/>
-              <a:t>	</a:t>
-            </a:r>
             <a:endParaRPr lang="en-US" sz="1600" dirty="0" smtClean="0"/>
           </a:p>
           <a:p>
@@ -5198,7 +5268,6 @@
               <a:rPr lang="en-US" sz="1600" dirty="0" smtClean="0"/>
               <a:t>}</a:t>
             </a:r>
-            <a:endParaRPr lang="en-US" sz="1600" dirty="0" smtClean="0"/>
           </a:p>
           <a:p>
             <a:pPr marL="169863"/>
@@ -5249,8 +5318,15 @@
             </a:r>
             <a:r>
               <a:rPr lang="en-US" sz="1600" dirty="0" smtClean="0"/>
-              <a:t>&lt; limit &gt;( const std::string&amp; message );</a:t>
-            </a:r>
+              <a:t>&lt; limit &gt;( const std::string&amp; message </a:t>
+            </a:r>
+            <a:r>
+              <a:rPr lang="en-US" sz="1600" dirty="0" smtClean="0"/>
+              <a:t>);</a:t>
+            </a:r>
+          </a:p>
+          <a:p>
+            <a:pPr marL="169863"/>
             <a:endParaRPr lang="en-US" sz="1600" dirty="0"/>
           </a:p>
           <a:p>
@@ -5309,7 +5385,6 @@
               <a:rPr lang="en-US" sz="1600" dirty="0" smtClean="0"/>
               <a:t>}</a:t>
             </a:r>
-            <a:endParaRPr lang="en-US" sz="1600" dirty="0" smtClean="0"/>
           </a:p>
         </p:txBody>
       </p:sp>
@@ -5409,15 +5484,7 @@
           <a:p>
             <a:r>
               <a:rPr lang="en-US" dirty="0" smtClean="0"/>
-              <a:t>template&lt; class T &gt; class </a:t>
-            </a:r>
-            <a:r>
-              <a:rPr lang="en-US" dirty="0" smtClean="0"/>
-              <a:t>v</a:t>
-            </a:r>
-            <a:r>
-              <a:rPr lang="en-US" dirty="0" smtClean="0"/>
-              <a:t>ector; // </a:t>
+              <a:t>template&lt; class T &gt; class vector; // </a:t>
             </a:r>
             <a:r>
               <a:rPr lang="ru-RU" dirty="0" smtClean="0"/>
@@ -5447,7 +5514,15 @@
             </a:r>
             <a:r>
               <a:rPr lang="en-US" dirty="0" smtClean="0"/>
-              <a:t>               // </a:t>
+              <a:t>              </a:t>
+            </a:r>
+            <a:r>
+              <a:rPr lang="en-US" dirty="0" smtClean="0"/>
+              <a:t>  </a:t>
+            </a:r>
+            <a:r>
+              <a:rPr lang="en-US" dirty="0" smtClean="0"/>
+              <a:t>// </a:t>
             </a:r>
             <a:r>
               <a:rPr lang="ru-RU" dirty="0" smtClean="0"/>
@@ -5629,27 +5704,7 @@
           <a:p>
             <a:r>
               <a:rPr lang="ru-RU" dirty="0" smtClean="0"/>
-              <a:t>Бьерн </a:t>
-            </a:r>
-            <a:r>
-              <a:rPr lang="ru-RU" dirty="0" smtClean="0"/>
-              <a:t>Страуструп - </a:t>
-            </a:r>
-            <a:r>
-              <a:rPr lang="ru-RU" dirty="0" smtClean="0"/>
-              <a:t>глава </a:t>
-            </a:r>
-            <a:r>
-              <a:rPr lang="ru-RU" dirty="0" smtClean="0"/>
-              <a:t>«</a:t>
-            </a:r>
-            <a:r>
-              <a:rPr lang="ru-RU" dirty="0" smtClean="0"/>
-              <a:t>Шаблоны</a:t>
-            </a:r>
-            <a:r>
-              <a:rPr lang="ru-RU" dirty="0" smtClean="0"/>
-              <a:t>».</a:t>
+              <a:t>Бьерн Страуструп - глава «Шаблоны».</a:t>
             </a:r>
             <a:endParaRPr lang="en-US" dirty="0"/>
           </a:p>
@@ -5794,13 +5849,45 @@
           <a:p>
             <a:r>
               <a:rPr lang="ru-RU" dirty="0" smtClean="0"/>
-              <a:t>Включать определения шаблонов до их использование в единице трансляции</a:t>
-            </a:r>
-          </a:p>
-          <a:p>
-            <a:r>
-              <a:rPr lang="ru-RU" dirty="0" smtClean="0"/>
-              <a:t>Включать объявления шаблонов до их использования в </a:t>
+              <a:t>Включать </a:t>
+            </a:r>
+            <a:r>
+              <a:rPr lang="ru-RU" b="1" dirty="0" smtClean="0"/>
+              <a:t>определения</a:t>
+            </a:r>
+            <a:r>
+              <a:rPr lang="ru-RU" dirty="0" smtClean="0"/>
+              <a:t> шаблонов до их </a:t>
+            </a:r>
+            <a:r>
+              <a:rPr lang="ru-RU" dirty="0" smtClean="0"/>
+              <a:t>использования </a:t>
+            </a:r>
+            <a:r>
+              <a:rPr lang="ru-RU" dirty="0" smtClean="0"/>
+              <a:t>в единице </a:t>
+            </a:r>
+            <a:r>
+              <a:rPr lang="ru-RU" dirty="0" smtClean="0"/>
+              <a:t>трансляции</a:t>
+            </a:r>
+            <a:endParaRPr lang="en-US" dirty="0" smtClean="0"/>
+          </a:p>
+          <a:p>
+            <a:endParaRPr lang="ru-RU" dirty="0" smtClean="0"/>
+          </a:p>
+          <a:p>
+            <a:r>
+              <a:rPr lang="ru-RU" dirty="0" smtClean="0"/>
+              <a:t>Включать </a:t>
+            </a:r>
+            <a:r>
+              <a:rPr lang="ru-RU" b="1" dirty="0" smtClean="0"/>
+              <a:t>объявления</a:t>
+            </a:r>
+            <a:r>
+              <a:rPr lang="ru-RU" dirty="0" smtClean="0"/>
+              <a:t> шаблонов до их использования в </a:t>
             </a:r>
             <a:r>
               <a:rPr lang="ru-RU" dirty="0"/>
@@ -6222,7 +6309,7 @@
         </p:nvSpPr>
         <p:spPr>
           <a:xfrm>
-            <a:off x="1371600" y="4800600"/>
+            <a:off x="685800" y="4800600"/>
             <a:ext cx="2743200" cy="914400"/>
           </a:xfrm>
           <a:prstGeom prst="wedgeRoundRectCallout">
@@ -6346,8 +6433,8 @@
         </p:nvSpPr>
         <p:spPr>
           <a:xfrm>
-            <a:off x="1676400" y="1371600"/>
-            <a:ext cx="5943600" cy="3276600"/>
+            <a:off x="1219200" y="1371600"/>
+            <a:ext cx="7010400" cy="3276600"/>
           </a:xfrm>
           <a:prstGeom prst="roundRect">
             <a:avLst/>
@@ -6461,7 +6548,15 @@
             </a:r>
             <a:r>
               <a:rPr lang="en-US" dirty="0" smtClean="0"/>
-              <a:t> &gt;( 11.0, 12.0 ); // !!! implicit cast double to </a:t>
+              <a:t> &gt;( 11.0, 12.0 ); // !!! implicit </a:t>
+            </a:r>
+            <a:r>
+              <a:rPr lang="en-US" b="1" dirty="0" smtClean="0"/>
+              <a:t>cast</a:t>
+            </a:r>
+            <a:r>
+              <a:rPr lang="en-US" dirty="0" smtClean="0"/>
+              <a:t> double to </a:t>
             </a:r>
             <a:r>
               <a:rPr lang="en-US" dirty="0" err="1" smtClean="0"/>
@@ -6487,7 +6582,7 @@
         </p:blipFill>
         <p:spPr>
           <a:xfrm>
-            <a:off x="1066800" y="5410200"/>
+            <a:off x="381000" y="5410200"/>
             <a:ext cx="1172308" cy="1295400"/>
           </a:xfrm>
           <a:prstGeom prst="rect">
@@ -6495,6 +6590,68 @@
           </a:prstGeom>
         </p:spPr>
       </p:pic>
+      <p:sp>
+        <p:nvSpPr>
+          <p:cNvPr id="6" name="Прямоугольник 5"/>
+          <p:cNvSpPr/>
+          <p:nvPr/>
+        </p:nvSpPr>
+        <p:spPr>
+          <a:xfrm>
+            <a:off x="1676400" y="6096000"/>
+            <a:ext cx="7162800" cy="369332"/>
+          </a:xfrm>
+          <a:prstGeom prst="rect">
+            <a:avLst/>
+          </a:prstGeom>
+        </p:spPr>
+        <p:txBody>
+          <a:bodyPr wrap="square">
+            <a:spAutoFit/>
+          </a:bodyPr>
+          <a:lstStyle/>
+          <a:p>
+            <a:pPr algn="r"/>
+            <a:r>
+              <a:rPr lang="en-US" dirty="0" smtClean="0">
+                <a:hlinkClick r:id="rId3"/>
+              </a:rPr>
+              <a:t>http://blogs.msdn.com/b/slippman/archive/2004/08/11/212768.aspx</a:t>
+            </a:r>
+            <a:endParaRPr lang="en-US" dirty="0" smtClean="0"/>
+          </a:p>
+        </p:txBody>
+      </p:sp>
+      <p:cxnSp>
+        <p:nvCxnSpPr>
+          <p:cNvPr id="7" name="Прямая соединительная линия 6"/>
+          <p:cNvCxnSpPr/>
+          <p:nvPr/>
+        </p:nvCxnSpPr>
+        <p:spPr>
+          <a:xfrm>
+            <a:off x="3581400" y="6019800"/>
+            <a:ext cx="5181600" cy="0"/>
+          </a:xfrm>
+          <a:prstGeom prst="line">
+            <a:avLst/>
+          </a:prstGeom>
+        </p:spPr>
+        <p:style>
+          <a:lnRef idx="1">
+            <a:schemeClr val="accent1"/>
+          </a:lnRef>
+          <a:fillRef idx="0">
+            <a:schemeClr val="accent1"/>
+          </a:fillRef>
+          <a:effectRef idx="0">
+            <a:schemeClr val="accent1"/>
+          </a:effectRef>
+          <a:fontRef idx="minor">
+            <a:schemeClr val="tx1"/>
+          </a:fontRef>
+        </p:style>
+      </p:cxnSp>
     </p:spTree>
   </p:cSld>
   <p:clrMapOvr>
@@ -6558,8 +6715,8 @@
         </p:nvSpPr>
         <p:spPr>
           <a:xfrm>
-            <a:off x="1295400" y="1828800"/>
-            <a:ext cx="6934200" cy="3429000"/>
+            <a:off x="1295400" y="1600200"/>
+            <a:ext cx="6934200" cy="4495800"/>
           </a:xfrm>
           <a:prstGeom prst="roundRect">
             <a:avLst/>
@@ -6618,15 +6775,7 @@
             </a:r>
             <a:r>
               <a:rPr lang="en-US" dirty="0" err="1" smtClean="0"/>
-              <a:t>t_p</a:t>
-            </a:r>
-            <a:r>
-              <a:rPr lang="en-US" dirty="0" smtClean="0"/>
-              <a:t>	</a:t>
-            </a:r>
-            <a:r>
-              <a:rPr lang="en-US" dirty="0" err="1" smtClean="0"/>
-              <a:t>tr</a:t>
+              <a:t>t_ptr</a:t>
             </a:r>
             <a:r>
               <a:rPr lang="en-US" dirty="0" smtClean="0"/>
@@ -6654,11 +6803,7 @@
             </a:r>
             <a:r>
               <a:rPr lang="en-US" dirty="0" smtClean="0"/>
-              <a:t> ( T* t = NULL );</a:t>
-            </a:r>
-            <a:r>
-              <a:rPr lang="en-US" dirty="0" smtClean="0"/>
-              <a:t>	</a:t>
+              <a:t> ( T* t = NULL );	</a:t>
             </a:r>
             <a:br>
               <a:rPr lang="en-US" dirty="0" smtClean="0"/>
@@ -6667,11 +6812,15 @@
               <a:rPr lang="en-US" dirty="0" smtClean="0"/>
               <a:t>};</a:t>
             </a:r>
-          </a:p>
-          <a:p>
-            <a:r>
-              <a:rPr lang="en-US" dirty="0" err="1" smtClean="0"/>
-              <a:t>tempalte</a:t>
+            <a:endParaRPr lang="ru-RU" dirty="0" smtClean="0"/>
+          </a:p>
+          <a:p>
+            <a:endParaRPr lang="en-US" dirty="0" smtClean="0"/>
+          </a:p>
+          <a:p>
+            <a:r>
+              <a:rPr lang="en-US" dirty="0" smtClean="0"/>
+              <a:t>template</a:t>
             </a:r>
             <a:r>
               <a:rPr lang="en-US" dirty="0" smtClean="0"/>
@@ -6968,16 +7117,16 @@
           </a:p>
           <a:p>
             <a:r>
-              <a:rPr lang="en-US" dirty="0" smtClean="0"/>
-              <a:t> </a:t>
-            </a:r>
-            <a:r>
               <a:rPr lang="en-US" dirty="0" err="1" smtClean="0"/>
               <a:t>template_example</a:t>
             </a:r>
             <a:r>
               <a:rPr lang="en-US" dirty="0" smtClean="0"/>
-              <a:t> &lt; double &gt; </a:t>
+              <a:t> </a:t>
+            </a:r>
+            <a:r>
+              <a:rPr lang="en-US" dirty="0" smtClean="0"/>
+              <a:t>&lt; double &gt; </a:t>
             </a:r>
             <a:r>
               <a:rPr lang="en-US" dirty="0" err="1" smtClean="0"/>
@@ -7012,24 +7161,20 @@
           </a:p>
           <a:p>
             <a:r>
-              <a:rPr lang="en-US" dirty="0" smtClean="0"/>
-              <a:t> </a:t>
-            </a:r>
-            <a:r>
               <a:rPr lang="en-US" dirty="0" err="1" smtClean="0"/>
               <a:t>template_example</a:t>
             </a:r>
             <a:r>
               <a:rPr lang="en-US" dirty="0" smtClean="0"/>
-              <a:t> &lt; string&gt; </a:t>
+              <a:t> </a:t>
+            </a:r>
+            <a:r>
+              <a:rPr lang="en-US" dirty="0" smtClean="0"/>
+              <a:t>&lt; string&gt; </a:t>
             </a:r>
             <a:r>
               <a:rPr lang="en-US" dirty="0" err="1" smtClean="0"/>
-              <a:t>string</a:t>
-            </a:r>
-            <a:r>
-              <a:rPr lang="en-US" dirty="0" err="1" smtClean="0"/>
-              <a:t>_ptr</a:t>
+              <a:t>string_ptr</a:t>
             </a:r>
             <a:r>
               <a:rPr lang="en-US" dirty="0" smtClean="0"/>
@@ -7041,11 +7186,7 @@
             </a:r>
             <a:r>
               <a:rPr lang="en-US" dirty="0" smtClean="0"/>
-              <a:t>“Hello!”</a:t>
-            </a:r>
-            <a:r>
-              <a:rPr lang="en-US" dirty="0" smtClean="0"/>
-              <a:t> )  );</a:t>
+              <a:t>“Hello!” )  );</a:t>
             </a:r>
           </a:p>
         </p:txBody>
@@ -7333,11 +7474,7 @@
             </a:r>
             <a:r>
               <a:rPr lang="en-US" dirty="0" err="1" smtClean="0"/>
-              <a:t>i_</a:t>
-            </a:r>
-            <a:r>
-              <a:rPr lang="en-US" dirty="0" err="1" smtClean="0"/>
-              <a:t>buff</a:t>
+              <a:t>i_buff</a:t>
             </a:r>
             <a:r>
               <a:rPr lang="en-US" dirty="0" smtClean="0"/>
@@ -7359,11 +7496,7 @@
             </a:r>
             <a:r>
               <a:rPr lang="en-US" dirty="0" err="1" smtClean="0"/>
-              <a:t>my_</a:t>
-            </a:r>
-            <a:r>
-              <a:rPr lang="en-US" dirty="0" err="1" smtClean="0"/>
-              <a:t>buff</a:t>
+              <a:t>my_buff</a:t>
             </a:r>
             <a:r>
               <a:rPr lang="en-US" dirty="0" smtClean="0"/>
@@ -7575,11 +7708,7 @@
             </a:r>
             <a:r>
               <a:rPr lang="en-US" dirty="0" err="1" smtClean="0"/>
-              <a:t>i_</a:t>
-            </a:r>
-            <a:r>
-              <a:rPr lang="en-US" dirty="0" err="1" smtClean="0"/>
-              <a:t>buff</a:t>
+              <a:t>i_buff</a:t>
             </a:r>
             <a:r>
               <a:rPr lang="en-US" dirty="0" smtClean="0"/>
@@ -7601,11 +7730,7 @@
             </a:r>
             <a:r>
               <a:rPr lang="en-US" dirty="0" err="1" smtClean="0"/>
-              <a:t>my_</a:t>
-            </a:r>
-            <a:r>
-              <a:rPr lang="en-US" dirty="0" err="1" smtClean="0"/>
-              <a:t>buff</a:t>
+              <a:t>my_buff</a:t>
             </a:r>
             <a:r>
               <a:rPr lang="en-US" dirty="0" smtClean="0"/>

</xml_diff>

<commit_message>
fix mistakes in presentation
</commit_message>
<xml_diff>
--- a/lections/cpp_craft_lec_5_pre.pptx
+++ b/lections/cpp_craft_lec_5_pre.pptx
@@ -218,6 +218,7 @@
           <a:p>
             <a:fld id="{9D2A6E17-AB36-4E53-A896-72D500841CBD}" type="datetimeFigureOut">
               <a:rPr lang="en-US" smtClean="0"/>
+              <a:pPr/>
               <a:t>11/4/2013</a:t>
             </a:fld>
             <a:endParaRPr lang="en-US"/>
@@ -284,6 +285,7 @@
           <a:p>
             <a:fld id="{468324A7-76C5-4946-B072-98EEE8C4D0B7}" type="slidenum">
               <a:rPr lang="en-US" smtClean="0"/>
+              <a:pPr/>
               <a:t>‹#›</a:t>
             </a:fld>
             <a:endParaRPr lang="en-US"/>
@@ -548,7 +550,7 @@
     </p:spTree>
     <p:extLst>
       <p:ext uri="{BB962C8B-B14F-4D97-AF65-F5344CB8AC3E}">
-        <p14:creationId xmlns:p14="http://schemas.microsoft.com/office/powerpoint/2010/main" xmlns="" val="402960394"/>
+        <p14:creationId xmlns="" xmlns:p14="http://schemas.microsoft.com/office/powerpoint/2010/main" val="402960394"/>
       </p:ext>
     </p:extLst>
   </p:cSld>
@@ -707,7 +709,6 @@
               <a:rPr lang="ru-RU" baseline="0" dirty="0" smtClean="0"/>
               <a:t> должны быть представлены независимо. Набор общих концепций – шаблоны.</a:t>
             </a:r>
-            <a:endParaRPr lang="ru-RU" baseline="0" dirty="0" smtClean="0"/>
           </a:p>
           <a:p>
             <a:pPr marL="228600" indent="-228600">
@@ -769,7 +770,7 @@
     </p:spTree>
     <p:extLst>
       <p:ext uri="{BB962C8B-B14F-4D97-AF65-F5344CB8AC3E}">
-        <p14:creationId xmlns:p14="http://schemas.microsoft.com/office/powerpoint/2010/main" xmlns="" val="1596205665"/>
+        <p14:creationId xmlns="" xmlns:p14="http://schemas.microsoft.com/office/powerpoint/2010/main" val="1596205665"/>
       </p:ext>
     </p:extLst>
   </p:cSld>
@@ -872,7 +873,7 @@
     </p:spTree>
     <p:extLst>
       <p:ext uri="{BB962C8B-B14F-4D97-AF65-F5344CB8AC3E}">
-        <p14:creationId xmlns:p14="http://schemas.microsoft.com/office/powerpoint/2010/main" xmlns="" val="2556783601"/>
+        <p14:creationId xmlns="" xmlns:p14="http://schemas.microsoft.com/office/powerpoint/2010/main" val="2556783601"/>
       </p:ext>
     </p:extLst>
   </p:cSld>
@@ -965,7 +966,7 @@
     </p:spTree>
     <p:extLst>
       <p:ext uri="{BB962C8B-B14F-4D97-AF65-F5344CB8AC3E}">
-        <p14:creationId xmlns:p14="http://schemas.microsoft.com/office/powerpoint/2010/main" xmlns="" val="105421614"/>
+        <p14:creationId xmlns="" xmlns:p14="http://schemas.microsoft.com/office/powerpoint/2010/main" val="105421614"/>
       </p:ext>
     </p:extLst>
   </p:cSld>
@@ -1068,7 +1069,7 @@
     </p:spTree>
     <p:extLst>
       <p:ext uri="{BB962C8B-B14F-4D97-AF65-F5344CB8AC3E}">
-        <p14:creationId xmlns:p14="http://schemas.microsoft.com/office/powerpoint/2010/main" xmlns="" val="1594442473"/>
+        <p14:creationId xmlns="" xmlns:p14="http://schemas.microsoft.com/office/powerpoint/2010/main" val="1594442473"/>
       </p:ext>
     </p:extLst>
   </p:cSld>
@@ -1157,7 +1158,7 @@
     </p:spTree>
     <p:extLst>
       <p:ext uri="{BB962C8B-B14F-4D97-AF65-F5344CB8AC3E}">
-        <p14:creationId xmlns:p14="http://schemas.microsoft.com/office/powerpoint/2010/main" xmlns="" val="2837681716"/>
+        <p14:creationId xmlns="" xmlns:p14="http://schemas.microsoft.com/office/powerpoint/2010/main" val="2837681716"/>
       </p:ext>
     </p:extLst>
   </p:cSld>
@@ -1282,7 +1283,7 @@
     </p:spTree>
     <p:extLst>
       <p:ext uri="{BB962C8B-B14F-4D97-AF65-F5344CB8AC3E}">
-        <p14:creationId xmlns:p14="http://schemas.microsoft.com/office/powerpoint/2010/main" xmlns="" val="2837681716"/>
+        <p14:creationId xmlns="" xmlns:p14="http://schemas.microsoft.com/office/powerpoint/2010/main" val="2837681716"/>
       </p:ext>
     </p:extLst>
   </p:cSld>
@@ -1420,7 +1421,7 @@
     </p:spTree>
     <p:extLst>
       <p:ext uri="{BB962C8B-B14F-4D97-AF65-F5344CB8AC3E}">
-        <p14:creationId xmlns:p14="http://schemas.microsoft.com/office/powerpoint/2010/main" xmlns="" val="1404515757"/>
+        <p14:creationId xmlns="" xmlns:p14="http://schemas.microsoft.com/office/powerpoint/2010/main" val="1404515757"/>
       </p:ext>
     </p:extLst>
   </p:cSld>
@@ -1670,7 +1671,7 @@
     </p:spTree>
     <p:extLst>
       <p:ext uri="{BB962C8B-B14F-4D97-AF65-F5344CB8AC3E}">
-        <p14:creationId xmlns:p14="http://schemas.microsoft.com/office/powerpoint/2010/main" xmlns="" val="2547174524"/>
+        <p14:creationId xmlns="" xmlns:p14="http://schemas.microsoft.com/office/powerpoint/2010/main" val="2547174524"/>
       </p:ext>
     </p:extLst>
   </p:cSld>
@@ -1781,7 +1782,7 @@
     </p:spTree>
     <p:extLst>
       <p:ext uri="{BB962C8B-B14F-4D97-AF65-F5344CB8AC3E}">
-        <p14:creationId xmlns:p14="http://schemas.microsoft.com/office/powerpoint/2010/main" xmlns="" val="2212771972"/>
+        <p14:creationId xmlns="" xmlns:p14="http://schemas.microsoft.com/office/powerpoint/2010/main" val="2212771972"/>
       </p:ext>
     </p:extLst>
   </p:cSld>
@@ -1898,7 +1899,7 @@
     </p:spTree>
     <p:extLst>
       <p:ext uri="{BB962C8B-B14F-4D97-AF65-F5344CB8AC3E}">
-        <p14:creationId xmlns:p14="http://schemas.microsoft.com/office/powerpoint/2010/main" xmlns="" val="3867929315"/>
+        <p14:creationId xmlns="" xmlns:p14="http://schemas.microsoft.com/office/powerpoint/2010/main" val="3867929315"/>
       </p:ext>
     </p:extLst>
   </p:cSld>
@@ -1991,7 +1992,7 @@
     </p:spTree>
     <p:extLst>
       <p:ext uri="{BB962C8B-B14F-4D97-AF65-F5344CB8AC3E}">
-        <p14:creationId xmlns:p14="http://schemas.microsoft.com/office/powerpoint/2010/main" xmlns="" val="2992045749"/>
+        <p14:creationId xmlns="" xmlns:p14="http://schemas.microsoft.com/office/powerpoint/2010/main" val="2992045749"/>
       </p:ext>
     </p:extLst>
   </p:cSld>
@@ -2076,7 +2077,7 @@
     </p:spTree>
     <p:extLst>
       <p:ext uri="{BB962C8B-B14F-4D97-AF65-F5344CB8AC3E}">
-        <p14:creationId xmlns:p14="http://schemas.microsoft.com/office/powerpoint/2010/main" xmlns="" val="2772776306"/>
+        <p14:creationId xmlns="" xmlns:p14="http://schemas.microsoft.com/office/powerpoint/2010/main" val="2772776306"/>
       </p:ext>
     </p:extLst>
   </p:cSld>
@@ -2213,11 +2214,7 @@
           <a:p>
             <a:r>
               <a:rPr lang="ru-RU" b="0" baseline="0" dirty="0" smtClean="0"/>
-              <a:t>При </a:t>
-            </a:r>
-            <a:r>
-              <a:rPr lang="ru-RU" b="0" baseline="0" dirty="0" smtClean="0"/>
-              <a:t>выводе аргументов не работает преобразование типов.</a:t>
+              <a:t>При выводе аргументов не работает преобразование типов.</a:t>
             </a:r>
             <a:endParaRPr lang="en-US" b="0" baseline="0" dirty="0" smtClean="0"/>
           </a:p>
@@ -2256,7 +2253,7 @@
     </p:spTree>
     <p:extLst>
       <p:ext uri="{BB962C8B-B14F-4D97-AF65-F5344CB8AC3E}">
-        <p14:creationId xmlns:p14="http://schemas.microsoft.com/office/powerpoint/2010/main" xmlns="" val="2972920284"/>
+        <p14:creationId xmlns="" xmlns:p14="http://schemas.microsoft.com/office/powerpoint/2010/main" val="2972920284"/>
       </p:ext>
     </p:extLst>
   </p:cSld>
@@ -2315,11 +2312,7 @@
             </a:pPr>
             <a:r>
               <a:rPr lang="ru-RU" dirty="0" smtClean="0"/>
-              <a:t>Отбор </a:t>
-            </a:r>
-            <a:r>
-              <a:rPr lang="ru-RU" dirty="0" smtClean="0"/>
-              <a:t>конкретизации функциональных шаблонов. Каждый функциональный</a:t>
+              <a:t>Отбор конкретизации функциональных шаблонов. Каждый функциональный</a:t>
             </a:r>
             <a:r>
               <a:rPr lang="ru-RU" baseline="0" dirty="0" smtClean="0"/>
@@ -2332,17 +2325,8 @@
             </a:pPr>
             <a:r>
               <a:rPr lang="ru-RU" baseline="0" dirty="0" smtClean="0"/>
-              <a:t>Выбор </a:t>
-            </a:r>
-            <a:r>
-              <a:rPr lang="ru-RU" baseline="0" dirty="0" smtClean="0"/>
-              <a:t>более </a:t>
-            </a:r>
-            <a:r>
-              <a:rPr lang="ru-RU" baseline="0" dirty="0" smtClean="0"/>
-              <a:t>специфической конкретизации.</a:t>
-            </a:r>
-            <a:endParaRPr lang="ru-RU" baseline="0" dirty="0" smtClean="0"/>
+              <a:t>Выбор более специфической конкретизации.</a:t>
+            </a:r>
           </a:p>
           <a:p>
             <a:pPr marL="228600" indent="-228600">
@@ -2350,19 +2334,7 @@
             </a:pPr>
             <a:r>
               <a:rPr lang="ru-RU" baseline="0" dirty="0" smtClean="0"/>
-              <a:t>Добавление к рассмотрению обычных функций. </a:t>
-            </a:r>
-            <a:r>
-              <a:rPr lang="ru-RU" baseline="0" dirty="0" smtClean="0"/>
-              <a:t>В окончательном выборе обычные фунции имеют </a:t>
-            </a:r>
-            <a:r>
-              <a:rPr lang="ru-RU" baseline="0" dirty="0" smtClean="0"/>
-              <a:t>приоритет</a:t>
-            </a:r>
-            <a:r>
-              <a:rPr lang="ru-RU" baseline="0" dirty="0" smtClean="0"/>
-              <a:t>.</a:t>
+              <a:t>Добавление к рассмотрению обычных функций. В окончательном выборе обычные фунции имеют приоритет.</a:t>
             </a:r>
           </a:p>
           <a:p>
@@ -2403,7 +2375,7 @@
     </p:spTree>
     <p:extLst>
       <p:ext uri="{BB962C8B-B14F-4D97-AF65-F5344CB8AC3E}">
-        <p14:creationId xmlns:p14="http://schemas.microsoft.com/office/powerpoint/2010/main" xmlns="" val="1850320161"/>
+        <p14:creationId xmlns="" xmlns:p14="http://schemas.microsoft.com/office/powerpoint/2010/main" val="1850320161"/>
       </p:ext>
     </p:extLst>
   </p:cSld>
@@ -5839,20 +5811,24 @@
           <a:lstStyle/>
           <a:p>
             <a:r>
-              <a:rPr lang="ru-RU" dirty="0"/>
+              <a:rPr lang="ru-RU"/>
               <a:t>параметры </a:t>
             </a:r>
             <a:r>
-              <a:rPr lang="ru-RU" dirty="0" err="1" smtClean="0"/>
-              <a:t>шаблнов</a:t>
+              <a:rPr lang="ru-RU" smtClean="0"/>
+              <a:t>шабл</a:t>
+            </a:r>
+            <a:r>
+              <a:rPr lang="ru-RU" smtClean="0"/>
+              <a:t>о</a:t>
+            </a:r>
+            <a:r>
+              <a:rPr lang="ru-RU" smtClean="0"/>
+              <a:t>нов </a:t>
             </a:r>
             <a:r>
               <a:rPr lang="ru-RU" dirty="0" smtClean="0"/>
-              <a:t> по </a:t>
-            </a:r>
-            <a:r>
-              <a:rPr lang="ru-RU" dirty="0" smtClean="0"/>
-              <a:t>умолчанию</a:t>
+              <a:t>по умолчанию</a:t>
             </a:r>
             <a:endParaRPr lang="en-US" dirty="0"/>
           </a:p>
@@ -6219,14 +6195,14 @@
             </a:r>
             <a:r>
               <a:rPr lang="en-US" dirty="0"/>
-              <a:t> class </a:t>
-            </a:r>
-            <a:endParaRPr lang="ru-RU" dirty="0" smtClean="0"/>
-          </a:p>
-          <a:p>
-            <a:r>
-              <a:rPr lang="ru-RU" dirty="0"/>
-              <a:t>	</a:t>
+              <a:t> </a:t>
+            </a:r>
+            <a:endParaRPr lang="en-US" dirty="0" smtClean="0"/>
+          </a:p>
+          <a:p>
+            <a:r>
+              <a:rPr lang="en-US" dirty="0" smtClean="0"/>
+              <a:t>                 class </a:t>
             </a:r>
             <a:r>
               <a:rPr lang="en-US" dirty="0" err="1" smtClean="0"/>
@@ -6238,15 +6214,7 @@
             </a:r>
             <a:r>
               <a:rPr lang="en-US" dirty="0"/>
-              <a:t>= allocator&lt;pair&lt;</a:t>
-            </a:r>
-            <a:r>
-              <a:rPr lang="en-US" dirty="0" err="1"/>
-              <a:t>const</a:t>
-            </a:r>
-            <a:r>
-              <a:rPr lang="en-US" dirty="0"/>
-              <a:t> </a:t>
+              <a:t>= allocator&lt;pair&lt;const </a:t>
             </a:r>
             <a:r>
               <a:rPr lang="en-US" dirty="0" err="1"/>
@@ -6255,10 +6223,6 @@
             <a:r>
               <a:rPr lang="en-US" dirty="0"/>
               <a:t>&gt; &gt; </a:t>
-            </a:r>
-            <a:r>
-              <a:rPr lang="ru-RU" dirty="0" smtClean="0"/>
-              <a:t>	</a:t>
             </a:r>
             <a:r>
               <a:rPr lang="en-US" dirty="0" smtClean="0"/>
@@ -6657,8 +6621,12 @@
               <a:t>	</a:t>
             </a:r>
             <a:r>
+              <a:rPr lang="en-US" dirty="0" smtClean="0"/>
+              <a:t> </a:t>
+            </a:r>
+            <a:r>
               <a:rPr lang="en-US" dirty="0" err="1" smtClean="0"/>
-              <a:t>impliti_cast</a:t>
+              <a:t>implicit_cast</a:t>
             </a:r>
             <a:r>
               <a:rPr lang="en-US" dirty="0" smtClean="0"/>
@@ -6687,12 +6655,20 @@
               <a:t>	</a:t>
             </a:r>
             <a:r>
+              <a:rPr lang="en-US" dirty="0" smtClean="0"/>
+              <a:t> </a:t>
+            </a:r>
+            <a:r>
               <a:rPr lang="en-US" dirty="0" err="1" smtClean="0"/>
-              <a:t>imlicit_cast</a:t>
-            </a:r>
-            <a:r>
-              <a:rPr lang="en-US" dirty="0" smtClean="0"/>
-              <a:t>&lt; double &gt;( </a:t>
+              <a:t>implicit_cast</a:t>
+            </a:r>
+            <a:r>
+              <a:rPr lang="en-US" dirty="0" smtClean="0"/>
+              <a:t> &lt; </a:t>
+            </a:r>
+            <a:r>
+              <a:rPr lang="en-US" dirty="0" smtClean="0"/>
+              <a:t>double &gt;( </a:t>
             </a:r>
             <a:r>
               <a:rPr lang="en-US" dirty="0" err="1" smtClean="0"/>
@@ -7013,7 +6989,15 @@
             </a:r>
             <a:r>
               <a:rPr lang="en-US" dirty="0" smtClean="0"/>
-              <a:t>&lt; double &gt;( complex&lt; double &gt; )</a:t>
+              <a:t>&lt; </a:t>
+            </a:r>
+            <a:r>
+              <a:rPr lang="en-US" dirty="0" smtClean="0"/>
+              <a:t>double &gt;( </a:t>
+            </a:r>
+            <a:r>
+              <a:rPr lang="en-US" dirty="0" smtClean="0"/>
+              <a:t>complex&lt; double &gt; )</a:t>
             </a:r>
             <a:br>
               <a:rPr lang="en-US" dirty="0" smtClean="0"/>
@@ -7881,11 +7865,7 @@
           <a:p>
             <a:r>
               <a:rPr lang="en-US" dirty="0" smtClean="0"/>
-              <a:t>template&lt; class T </a:t>
-            </a:r>
-            <a:r>
-              <a:rPr lang="en-US" dirty="0" smtClean="0"/>
-              <a:t>&gt; class vector { </a:t>
+              <a:t>template&lt; class T &gt; class vector { </a:t>
             </a:r>
             <a:r>
               <a:rPr lang="ru-RU" dirty="0" smtClean="0"/>
@@ -7936,11 +7916,7 @@
           <a:p>
             <a:r>
               <a:rPr lang="en-US" dirty="0" smtClean="0"/>
-              <a:t>template</a:t>
-            </a:r>
-            <a:r>
-              <a:rPr lang="en-US" dirty="0" smtClean="0"/>
-              <a:t>&lt;&gt; class vector&lt; void* &gt; { </a:t>
+              <a:t>template&lt;&gt; class vector&lt; void* &gt; { </a:t>
             </a:r>
             <a:r>
               <a:rPr lang="ru-RU" dirty="0" smtClean="0"/>
@@ -7991,11 +7967,7 @@
           <a:p>
             <a:r>
               <a:rPr lang="en-US" dirty="0" smtClean="0"/>
-              <a:t>template</a:t>
-            </a:r>
-            <a:r>
-              <a:rPr lang="en-US" dirty="0" smtClean="0"/>
-              <a:t>&lt; T &gt; class vector&lt; T* &gt; { </a:t>
+              <a:t>template&lt; T &gt; class vector&lt; T* &gt; { </a:t>
             </a:r>
             <a:r>
               <a:rPr lang="ru-RU" dirty="0" smtClean="0"/>
@@ -8336,11 +8308,7 @@
           <a:p>
             <a:r>
               <a:rPr lang="ru-RU" dirty="0" smtClean="0"/>
-              <a:t>Бьерн Страуструп - глава «Шаблоны</a:t>
-            </a:r>
-            <a:r>
-              <a:rPr lang="ru-RU" dirty="0" smtClean="0"/>
-              <a:t>».</a:t>
+              <a:t>Бьерн Страуструп - глава «Шаблоны».</a:t>
             </a:r>
             <a:endParaRPr lang="en-US" dirty="0" smtClean="0"/>
           </a:p>
@@ -8387,11 +8355,7 @@
             </a:pPr>
             <a:r>
               <a:rPr lang="ru-RU" sz="2400" i="1" dirty="0" smtClean="0"/>
-              <a:t>- Б. </a:t>
-            </a:r>
-            <a:r>
-              <a:rPr lang="ru-RU" sz="2400" i="1" dirty="0" smtClean="0"/>
-              <a:t>Страуструп</a:t>
+              <a:t>- Б. Страуструп</a:t>
             </a:r>
             <a:endParaRPr lang="en-US" sz="2400" i="1" dirty="0"/>
           </a:p>
@@ -8497,11 +8461,7 @@
             </a:r>
             <a:r>
               <a:rPr lang="en-US" dirty="0" smtClean="0"/>
-              <a:t> </a:t>
-            </a:r>
-            <a:r>
-              <a:rPr lang="en-US" dirty="0" smtClean="0"/>
-              <a:t>{ //… };</a:t>
+              <a:t> { //… };</a:t>
             </a:r>
           </a:p>
           <a:p>
@@ -8510,25 +8470,13 @@
           <a:p>
             <a:r>
               <a:rPr lang="en-US" dirty="0" smtClean="0"/>
-              <a:t>template</a:t>
-            </a:r>
-            <a:r>
-              <a:rPr lang="en-US" dirty="0" smtClean="0"/>
-              <a:t>&lt; class T &gt;</a:t>
-            </a:r>
-          </a:p>
-          <a:p>
-            <a:r>
-              <a:rPr lang="en-US" dirty="0" smtClean="0"/>
-              <a:t>class </a:t>
-            </a:r>
-            <a:r>
-              <a:rPr lang="en-US" dirty="0" smtClean="0"/>
-              <a:t>nested : </a:t>
-            </a:r>
-            <a:r>
-              <a:rPr lang="en-US" dirty="0" smtClean="0"/>
-              <a:t>public </a:t>
+              <a:t>template&lt; class T &gt;</a:t>
+            </a:r>
+          </a:p>
+          <a:p>
+            <a:r>
+              <a:rPr lang="en-US" dirty="0" smtClean="0"/>
+              <a:t>class nested : public </a:t>
             </a:r>
             <a:r>
               <a:rPr lang="en-US" dirty="0" err="1" smtClean="0"/>
@@ -8538,7 +8486,6 @@
               <a:rPr lang="en-US" dirty="0" smtClean="0"/>
               <a:t>&lt; T &gt;</a:t>
             </a:r>
-            <a:endParaRPr lang="en-US" dirty="0" smtClean="0"/>
           </a:p>
           <a:p>
             <a:r>
@@ -8606,11 +8553,7 @@
           <a:p>
             <a:r>
               <a:rPr lang="en-US" dirty="0" smtClean="0"/>
-              <a:t>template</a:t>
-            </a:r>
-            <a:r>
-              <a:rPr lang="en-US" dirty="0" smtClean="0"/>
-              <a:t>&lt; class T &gt;</a:t>
+              <a:t>template&lt; class T &gt;</a:t>
             </a:r>
           </a:p>
           <a:p>
@@ -8624,15 +8567,7 @@
             </a:r>
             <a:r>
               <a:rPr lang="en-US" dirty="0" smtClean="0"/>
-              <a:t> : </a:t>
-            </a:r>
-            <a:r>
-              <a:rPr lang="en-US" dirty="0" smtClean="0"/>
-              <a:t>public </a:t>
-            </a:r>
-            <a:r>
-              <a:rPr lang="en-US" dirty="0" smtClean="0"/>
-              <a:t>std::vector&lt; </a:t>
+              <a:t> : public std::vector&lt; </a:t>
             </a:r>
             <a:r>
               <a:rPr lang="en-US" dirty="0" err="1" smtClean="0"/>
@@ -8642,7 +8577,6 @@
               <a:rPr lang="en-US" dirty="0" smtClean="0"/>
               <a:t> &gt;</a:t>
             </a:r>
-            <a:endParaRPr lang="en-US" dirty="0" smtClean="0"/>
           </a:p>
           <a:p>
             <a:r>
@@ -9126,7 +9060,7 @@
     </p:spTree>
     <p:extLst>
       <p:ext uri="{BB962C8B-B14F-4D97-AF65-F5344CB8AC3E}">
-        <p14:creationId xmlns:p14="http://schemas.microsoft.com/office/powerpoint/2010/main" xmlns="" val="3744971786"/>
+        <p14:creationId xmlns="" xmlns:p14="http://schemas.microsoft.com/office/powerpoint/2010/main" val="3744971786"/>
       </p:ext>
     </p:extLst>
   </p:cSld>

</xml_diff>